<commit_message>
Update 7200 Proj Planning Pre - Team 2.pptx
</commit_message>
<xml_diff>
--- a/7200 Proj Planning Pre - Team 2.pptx
+++ b/7200 Proj Planning Pre - Team 2.pptx
@@ -8062,7 +8062,7 @@
             </a:pPr>
             <a:r>
               <a:rPr lang="en" sz="1600"/>
-              <a:t>Features of</a:t>
+              <a:t>Some of the features of</a:t>
             </a:r>
             <a:r>
               <a:rPr lang="en" sz="1600"/>
@@ -8082,7 +8082,15 @@
             </a:pPr>
             <a:r>
               <a:rPr lang="en" sz="1600"/>
-              <a:t>Video ID, Title, Published Date, Channel ID, Channel Title, CategoryID, Tags, View_count, Likes, Comment_count</a:t>
+              <a:t>Video ID, </a:t>
+            </a:r>
+            <a:r>
+              <a:rPr lang="en" sz="1600"/>
+              <a:t>Title, </a:t>
+            </a:r>
+            <a:r>
+              <a:rPr lang="en" sz="1600"/>
+              <a:t>CategoryID, Tags, View_count, Likes, Comment_count</a:t>
             </a:r>
             <a:endParaRPr sz="1600"/>
           </a:p>
@@ -8211,7 +8219,7 @@
             </a:r>
             <a:r>
               <a:rPr lang="en" sz="1700"/>
-              <a:t>  Implement data structures and I/O system to ingest and store data and prepare for analysis</a:t>
+              <a:t>  Implement data structures and I/O system to ingest and store data and prepare for analysis. Start on UI interface implementation</a:t>
             </a:r>
             <a:endParaRPr sz="1700"/>
           </a:p>
@@ -8251,7 +8259,7 @@
             </a:r>
             <a:r>
               <a:rPr lang="en" sz="1700"/>
-              <a:t>  Visualization,  UI interface implementation</a:t>
+              <a:t>  Visualization,  UI interface wrap-up, and tidy things up</a:t>
             </a:r>
             <a:endParaRPr sz="1700"/>
           </a:p>
@@ -8431,7 +8439,7 @@
             </a:pPr>
             <a:r>
               <a:rPr lang="en"/>
-              <a:t>We might also include HTML, CSS, and JavaScript code within Play framework to integrate visualizations generated by Scala</a:t>
+              <a:t>If Play framework used, we might also include JavaScript code to integrate visualizations generated by Scala</a:t>
             </a:r>
             <a:endParaRPr/>
           </a:p>
@@ -8521,161 +8529,74 @@
         </p:spPr>
         <p:txBody>
           <a:bodyPr anchorCtr="0" anchor="t" bIns="91425" lIns="91425" spcFirstLastPara="1" rIns="91425" wrap="square" tIns="91425">
-            <a:normAutofit fontScale="77500" lnSpcReduction="20000"/>
+            <a:normAutofit/>
           </a:bodyPr>
           <a:lstStyle/>
           <a:p>
-            <a:pPr indent="0" lvl="0" marL="0" rtl="0" algn="l">
-              <a:spcBef>
-                <a:spcPts val="0"/>
-              </a:spcBef>
-              <a:spcAft>
-                <a:spcPts val="0"/>
-              </a:spcAft>
-              <a:buNone/>
+            <a:pPr indent="-355600" lvl="0" marL="457200" rtl="0" algn="l">
+              <a:lnSpc>
+                <a:spcPct val="200000"/>
+              </a:lnSpc>
+              <a:spcBef>
+                <a:spcPts val="0"/>
+              </a:spcBef>
+              <a:spcAft>
+                <a:spcPts val="0"/>
+              </a:spcAft>
+              <a:buSzPts val="2000"/>
+              <a:buChar char="●"/>
             </a:pPr>
             <a:r>
-              <a:rPr lang="en"/>
-              <a:t>We will test some important units of our data: </a:t>
+              <a:rPr lang="en" sz="2000"/>
+              <a:t>Web interface response time should be within 4 seconds</a:t>
             </a:r>
-            <a:endParaRPr/>
+            <a:endParaRPr sz="2000"/>
+          </a:p>
+          <a:p>
+            <a:pPr indent="-355600" lvl="0" marL="457200" rtl="0" algn="l">
+              <a:lnSpc>
+                <a:spcPct val="200000"/>
+              </a:lnSpc>
+              <a:spcBef>
+                <a:spcPts val="0"/>
+              </a:spcBef>
+              <a:spcAft>
+                <a:spcPts val="0"/>
+              </a:spcAft>
+              <a:buSzPts val="2000"/>
+              <a:buChar char="●"/>
+            </a:pPr>
+            <a:r>
+              <a:rPr lang="en" sz="2000"/>
+              <a:t>RMSE value should be around 0.5</a:t>
+            </a:r>
+            <a:endParaRPr sz="2000"/>
+          </a:p>
+          <a:p>
+            <a:pPr indent="-355600" lvl="0" marL="457200" rtl="0" algn="l">
+              <a:lnSpc>
+                <a:spcPct val="200000"/>
+              </a:lnSpc>
+              <a:spcBef>
+                <a:spcPts val="0"/>
+              </a:spcBef>
+              <a:spcAft>
+                <a:spcPts val="0"/>
+              </a:spcAft>
+              <a:buSzPts val="2000"/>
+              <a:buChar char="●"/>
+            </a:pPr>
+            <a:r>
+              <a:rPr lang="en" sz="2000"/>
+              <a:t>If regression model was used, R-square score should be around 0.7</a:t>
+            </a:r>
+            <a:endParaRPr sz="2000"/>
           </a:p>
           <a:p>
             <a:pPr indent="0" lvl="0" marL="0" rtl="0" algn="l">
-              <a:spcBef>
-                <a:spcPts val="1200"/>
-              </a:spcBef>
-              <a:spcAft>
-                <a:spcPts val="0"/>
-              </a:spcAft>
-              <a:buNone/>
-            </a:pPr>
-            <a:r>
-              <a:rPr lang="en"/>
-              <a:t>Real-time data:</a:t>
-            </a:r>
-            <a:endParaRPr/>
-          </a:p>
-          <a:p>
-            <a:pPr indent="-317182" lvl="0" marL="457200" rtl="0" algn="l">
-              <a:spcBef>
-                <a:spcPts val="1200"/>
-              </a:spcBef>
-              <a:spcAft>
-                <a:spcPts val="0"/>
-              </a:spcAft>
-              <a:buSzPct val="100000"/>
-              <a:buChar char="●"/>
-            </a:pPr>
-            <a:r>
-              <a:rPr lang="en"/>
-              <a:t>The VideoID can’t be null and should be a unique value</a:t>
-            </a:r>
-            <a:endParaRPr/>
-          </a:p>
-          <a:p>
-            <a:pPr indent="-317182" lvl="0" marL="457200" rtl="0" algn="l">
-              <a:spcBef>
-                <a:spcPts val="0"/>
-              </a:spcBef>
-              <a:spcAft>
-                <a:spcPts val="0"/>
-              </a:spcAft>
-              <a:buSzPct val="100000"/>
-              <a:buChar char="●"/>
-            </a:pPr>
-            <a:r>
-              <a:rPr lang="en"/>
-              <a:t>Likes, view_count, comment_count should be Long</a:t>
-            </a:r>
-            <a:endParaRPr/>
-          </a:p>
-          <a:p>
-            <a:pPr indent="-317182" lvl="0" marL="457200" rtl="0" algn="l">
-              <a:spcBef>
-                <a:spcPts val="0"/>
-              </a:spcBef>
-              <a:spcAft>
-                <a:spcPts val="0"/>
-              </a:spcAft>
-              <a:buSzPct val="100000"/>
-              <a:buChar char="●"/>
-            </a:pPr>
-            <a:r>
-              <a:rPr lang="en"/>
-              <a:t>The categoryID can’t be null</a:t>
-            </a:r>
-            <a:endParaRPr/>
-          </a:p>
-          <a:p>
-            <a:pPr indent="0" lvl="0" marL="0" rtl="0" algn="l">
-              <a:spcBef>
-                <a:spcPts val="1200"/>
-              </a:spcBef>
-              <a:spcAft>
-                <a:spcPts val="0"/>
-              </a:spcAft>
-              <a:buNone/>
-            </a:pPr>
-            <a:r>
-              <a:rPr lang="en"/>
-              <a:t>Integration:</a:t>
-            </a:r>
-            <a:endParaRPr/>
-          </a:p>
-          <a:p>
-            <a:pPr indent="0" lvl="0" marL="0" rtl="0" algn="l">
-              <a:spcBef>
-                <a:spcPts val="1200"/>
-              </a:spcBef>
-              <a:spcAft>
-                <a:spcPts val="0"/>
-              </a:spcAft>
-              <a:buNone/>
-            </a:pPr>
-            <a:r>
-              <a:rPr lang="en"/>
-              <a:t>The column names and types of kaggle dataset should be similar to that of streamed real-time data.</a:t>
-            </a:r>
-            <a:endParaRPr/>
-          </a:p>
-          <a:p>
-            <a:pPr indent="0" lvl="0" marL="0" rtl="0" algn="l">
-              <a:spcBef>
-                <a:spcPts val="1200"/>
-              </a:spcBef>
-              <a:spcAft>
-                <a:spcPts val="0"/>
-              </a:spcAft>
-              <a:buNone/>
-            </a:pPr>
-            <a:br>
-              <a:rPr lang="en"/>
-            </a:br>
-            <a:r>
-              <a:rPr lang="en"/>
-              <a:t>Model Training: </a:t>
-            </a:r>
-            <a:endParaRPr/>
-          </a:p>
-          <a:p>
-            <a:pPr indent="0" lvl="0" marL="0" rtl="0" algn="l">
-              <a:spcBef>
-                <a:spcPts val="1200"/>
-              </a:spcBef>
-              <a:spcAft>
-                <a:spcPts val="0"/>
-              </a:spcAft>
-              <a:buNone/>
-            </a:pPr>
-            <a:r>
-              <a:rPr lang="en"/>
-              <a:t>RMSE as close to 0.4  (and small) as possible and R-square score should be around 0.7</a:t>
-            </a:r>
-            <a:endParaRPr/>
-          </a:p>
-          <a:p>
-            <a:pPr indent="0" lvl="0" marL="0" rtl="0" algn="l">
+              <a:lnSpc>
+                <a:spcPct val="200000"/>
+              </a:lnSpc>
               <a:spcBef>
                 <a:spcPts val="1200"/>
               </a:spcBef>
@@ -8687,7 +8608,7 @@
             <a:r>
               <a:t/>
             </a:r>
-            <a:endParaRPr/>
+            <a:endParaRPr sz="2000"/>
           </a:p>
         </p:txBody>
       </p:sp>

</xml_diff>